<commit_message>
updates to QRPH xaction #s in vol-1 Actors
</commit_message>
<xml_diff>
--- a/input/images-source/25-01-22 CCG Profile Graphics.pptx
+++ b/input/images-source/25-01-22 CCG Profile Graphics.pptx
@@ -172,7 +172,7 @@
 <file path=ppt/revisionInfo.xml><?xml version="1.0" encoding="utf-8"?>
 <p1510:revInfo xmlns:a="http://schemas.openxmlformats.org/drawingml/2006/main" xmlns:r="http://schemas.openxmlformats.org/officeDocument/2006/relationships" xmlns:p1510="http://schemas.microsoft.com/office/powerpoint/2015/10/main">
   <p1510:revLst>
-    <p1510:client id="{93D51821-5D50-43CA-9DF1-2C2B5339BB4D}" v="151" dt="2025-01-23T16:47:15.207"/>
+    <p1510:client id="{78701E41-96E2-4D9C-9851-2F6EA43A2F40}" v="1" dt="2025-01-24T16:55:42.526"/>
   </p1510:revLst>
 </p1510:revInfo>
 </file>
@@ -274,14 +274,6 @@
             <pc:docMk/>
             <pc:sldMk cId="1746381635" sldId="326"/>
             <ac:spMk id="13" creationId="{5EF946AC-64A5-1B95-723D-6F6AC347354C}"/>
-          </ac:spMkLst>
-        </pc:spChg>
-        <pc:spChg chg="del">
-          <ac:chgData name="Derek Ritz" userId="8fe56b9ef4ca82ce" providerId="LiveId" clId="{93D51821-5D50-43CA-9DF1-2C2B5339BB4D}" dt="2025-01-22T21:43:18.075" v="6" actId="478"/>
-          <ac:spMkLst>
-            <pc:docMk/>
-            <pc:sldMk cId="1746381635" sldId="326"/>
-            <ac:spMk id="14" creationId="{1BE0B5F7-1525-CD3C-6658-FE8B618DCC1A}"/>
           </ac:spMkLst>
         </pc:spChg>
         <pc:cxnChg chg="mod">
@@ -743,14 +735,6 @@
           <pc:docMk/>
           <pc:sldMk cId="2830585979" sldId="849"/>
         </pc:sldMkLst>
-        <pc:spChg chg="mod ord">
-          <ac:chgData name="Derek Ritz" userId="8fe56b9ef4ca82ce" providerId="LiveId" clId="{93D51821-5D50-43CA-9DF1-2C2B5339BB4D}" dt="2025-01-22T21:50:56.426" v="29" actId="700"/>
-          <ac:spMkLst>
-            <pc:docMk/>
-            <pc:sldMk cId="2830585979" sldId="849"/>
-            <ac:spMk id="2" creationId="{80A184F6-3EA0-4B8B-BB8D-D8B78C59BBDE}"/>
-          </ac:spMkLst>
-        </pc:spChg>
         <pc:spChg chg="mod">
           <ac:chgData name="Derek Ritz" userId="8fe56b9ef4ca82ce" providerId="LiveId" clId="{93D51821-5D50-43CA-9DF1-2C2B5339BB4D}" dt="2025-01-22T21:54:23.331" v="81" actId="1076"/>
           <ac:spMkLst>
@@ -813,14 +797,6 @@
             <pc:docMk/>
             <pc:sldMk cId="2830585979" sldId="849"/>
             <ac:spMk id="12" creationId="{27171661-B56C-4F43-AB66-1014E483AD27}"/>
-          </ac:spMkLst>
-        </pc:spChg>
-        <pc:spChg chg="del mod ord">
-          <ac:chgData name="Derek Ritz" userId="8fe56b9ef4ca82ce" providerId="LiveId" clId="{93D51821-5D50-43CA-9DF1-2C2B5339BB4D}" dt="2025-01-22T21:50:59.211" v="30" actId="478"/>
-          <ac:spMkLst>
-            <pc:docMk/>
-            <pc:sldMk cId="2830585979" sldId="849"/>
-            <ac:spMk id="14" creationId="{BBF6793B-2D60-494B-AB66-D8B36DDAB482}"/>
           </ac:spMkLst>
         </pc:spChg>
         <pc:picChg chg="mod">
@@ -2053,30 +2029,6 @@
             <ac:spMk id="20" creationId="{EDBBE309-BC41-40B8-ADF3-BD213EF682BE}"/>
           </ac:spMkLst>
         </pc:spChg>
-        <pc:spChg chg="del">
-          <ac:chgData name="Derek Ritz" userId="8fe56b9ef4ca82ce" providerId="LiveId" clId="{93D51821-5D50-43CA-9DF1-2C2B5339BB4D}" dt="2025-01-22T22:10:47.566" v="143" actId="478"/>
-          <ac:spMkLst>
-            <pc:docMk/>
-            <pc:sldMk cId="3791092007" sldId="1099"/>
-            <ac:spMk id="22" creationId="{E5ED6B06-6212-B1DA-F60E-9951DC019F29}"/>
-          </ac:spMkLst>
-        </pc:spChg>
-        <pc:spChg chg="add del mod">
-          <ac:chgData name="Derek Ritz" userId="8fe56b9ef4ca82ce" providerId="LiveId" clId="{93D51821-5D50-43CA-9DF1-2C2B5339BB4D}" dt="2025-01-22T22:11:53.421" v="147" actId="700"/>
-          <ac:spMkLst>
-            <pc:docMk/>
-            <pc:sldMk cId="3791092007" sldId="1099"/>
-            <ac:spMk id="24" creationId="{7CACA9DB-DE3C-C226-8006-93D47FC10BA8}"/>
-          </ac:spMkLst>
-        </pc:spChg>
-        <pc:spChg chg="del">
-          <ac:chgData name="Derek Ritz" userId="8fe56b9ef4ca82ce" providerId="LiveId" clId="{93D51821-5D50-43CA-9DF1-2C2B5339BB4D}" dt="2025-01-22T22:11:49.862" v="146" actId="478"/>
-          <ac:spMkLst>
-            <pc:docMk/>
-            <pc:sldMk cId="3791092007" sldId="1099"/>
-            <ac:spMk id="33" creationId="{25D03A17-64B9-C7B8-E241-587383F75DBC}"/>
-          </ac:spMkLst>
-        </pc:spChg>
       </pc:sldChg>
       <pc:sldChg chg="delSp add mod ord">
         <pc:chgData name="Derek Ritz" userId="8fe56b9ef4ca82ce" providerId="LiveId" clId="{93D51821-5D50-43CA-9DF1-2C2B5339BB4D}" dt="2025-01-22T21:56:49.854" v="105" actId="478"/>
@@ -2084,14 +2036,6 @@
           <pc:docMk/>
           <pc:sldMk cId="694033233" sldId="1100"/>
         </pc:sldMkLst>
-        <pc:spChg chg="del">
-          <ac:chgData name="Derek Ritz" userId="8fe56b9ef4ca82ce" providerId="LiveId" clId="{93D51821-5D50-43CA-9DF1-2C2B5339BB4D}" dt="2025-01-22T21:56:49.854" v="105" actId="478"/>
-          <ac:spMkLst>
-            <pc:docMk/>
-            <pc:sldMk cId="694033233" sldId="1100"/>
-            <ac:spMk id="11" creationId="{A2FBBF5A-906F-342E-CDE9-0E985A01B068}"/>
-          </ac:spMkLst>
-        </pc:spChg>
       </pc:sldChg>
       <pc:sldChg chg="add del">
         <pc:chgData name="Derek Ritz" userId="8fe56b9ef4ca82ce" providerId="LiveId" clId="{93D51821-5D50-43CA-9DF1-2C2B5339BB4D}" dt="2025-01-22T22:10:29.422" v="140" actId="47"/>
@@ -2106,36 +2050,12 @@
           <pc:docMk/>
           <pc:sldMk cId="2083713296" sldId="1102"/>
         </pc:sldMkLst>
-        <pc:spChg chg="del">
-          <ac:chgData name="Derek Ritz" userId="8fe56b9ef4ca82ce" providerId="LiveId" clId="{93D51821-5D50-43CA-9DF1-2C2B5339BB4D}" dt="2025-01-22T22:05:34.181" v="117" actId="478"/>
-          <ac:spMkLst>
-            <pc:docMk/>
-            <pc:sldMk cId="2083713296" sldId="1102"/>
-            <ac:spMk id="6" creationId="{26E98E01-FBD2-DE2E-BB67-7123F3A303B8}"/>
-          </ac:spMkLst>
-        </pc:spChg>
         <pc:spChg chg="add mod ord">
           <ac:chgData name="Derek Ritz" userId="8fe56b9ef4ca82ce" providerId="LiveId" clId="{93D51821-5D50-43CA-9DF1-2C2B5339BB4D}" dt="2025-01-22T22:07:45.012" v="131" actId="167"/>
           <ac:spMkLst>
             <pc:docMk/>
             <pc:sldMk cId="2083713296" sldId="1102"/>
             <ac:spMk id="7" creationId="{D2561900-C1D2-EF5B-40B7-E8C7A649C1DD}"/>
-          </ac:spMkLst>
-        </pc:spChg>
-        <pc:spChg chg="del">
-          <ac:chgData name="Derek Ritz" userId="8fe56b9ef4ca82ce" providerId="LiveId" clId="{93D51821-5D50-43CA-9DF1-2C2B5339BB4D}" dt="2025-01-22T22:06:03.486" v="120" actId="478"/>
-          <ac:spMkLst>
-            <pc:docMk/>
-            <pc:sldMk cId="2083713296" sldId="1102"/>
-            <ac:spMk id="11" creationId="{7CF93095-0854-355C-E754-D1CAD86A9263}"/>
-          </ac:spMkLst>
-        </pc:spChg>
-        <pc:spChg chg="del mod">
-          <ac:chgData name="Derek Ritz" userId="8fe56b9ef4ca82ce" providerId="LiveId" clId="{93D51821-5D50-43CA-9DF1-2C2B5339BB4D}" dt="2025-01-22T22:06:01.979" v="119" actId="478"/>
-          <ac:spMkLst>
-            <pc:docMk/>
-            <pc:sldMk cId="2083713296" sldId="1102"/>
-            <ac:spMk id="12" creationId="{F402DCAC-0FD6-7A13-89B3-62EE5980AA20}"/>
           </ac:spMkLst>
         </pc:spChg>
         <pc:spChg chg="ord">
@@ -2160,14 +2080,6 @@
             <pc:docMk/>
             <pc:sldMk cId="2083713296" sldId="1102"/>
             <ac:spMk id="19" creationId="{4B9DD1CD-AE3B-50C1-805B-675185918A53}"/>
-          </ac:spMkLst>
-        </pc:spChg>
-        <pc:spChg chg="del">
-          <ac:chgData name="Derek Ritz" userId="8fe56b9ef4ca82ce" providerId="LiveId" clId="{93D51821-5D50-43CA-9DF1-2C2B5339BB4D}" dt="2025-01-22T22:06:05.105" v="121" actId="478"/>
-          <ac:spMkLst>
-            <pc:docMk/>
-            <pc:sldMk cId="2083713296" sldId="1102"/>
-            <ac:spMk id="21" creationId="{AD491E96-719A-86BD-512D-40F56C397B8D}"/>
           </ac:spMkLst>
         </pc:spChg>
         <pc:picChg chg="mod">
@@ -2276,14 +2188,6 @@
             <ac:picMk id="2" creationId="{E33E627A-FC36-106A-1CC6-2D3E10FD61CB}"/>
           </ac:picMkLst>
         </pc:picChg>
-        <pc:picChg chg="del">
-          <ac:chgData name="Derek Ritz" userId="8fe56b9ef4ca82ce" providerId="LiveId" clId="{93D51821-5D50-43CA-9DF1-2C2B5339BB4D}" dt="2025-01-22T22:17:16.967" v="172" actId="478"/>
-          <ac:picMkLst>
-            <pc:docMk/>
-            <pc:sldMk cId="3807199918" sldId="1107"/>
-            <ac:picMk id="4" creationId="{65E19F0C-4C3E-2E89-FD0E-B176D41D960C}"/>
-          </ac:picMkLst>
-        </pc:picChg>
       </pc:sldChg>
       <pc:sldChg chg="addSp delSp modSp add mod">
         <pc:chgData name="Derek Ritz" userId="8fe56b9ef4ca82ce" providerId="LiveId" clId="{93D51821-5D50-43CA-9DF1-2C2B5339BB4D}" dt="2025-01-22T22:18:34.047" v="190" actId="1076"/>
@@ -2299,22 +2203,6 @@
             <ac:spMk id="3" creationId="{365F0017-A860-03C4-7473-F425D9192F7A}"/>
           </ac:spMkLst>
         </pc:spChg>
-        <pc:picChg chg="del">
-          <ac:chgData name="Derek Ritz" userId="8fe56b9ef4ca82ce" providerId="LiveId" clId="{93D51821-5D50-43CA-9DF1-2C2B5339BB4D}" dt="2025-01-22T22:18:29.220" v="188" actId="478"/>
-          <ac:picMkLst>
-            <pc:docMk/>
-            <pc:sldMk cId="3984019750" sldId="1108"/>
-            <ac:picMk id="2" creationId="{CA618D24-A3F4-6EA9-4920-8E7297ED6185}"/>
-          </ac:picMkLst>
-        </pc:picChg>
-        <pc:picChg chg="add del mod">
-          <ac:chgData name="Derek Ritz" userId="8fe56b9ef4ca82ce" providerId="LiveId" clId="{93D51821-5D50-43CA-9DF1-2C2B5339BB4D}" dt="2025-01-22T22:18:27.537" v="187" actId="21"/>
-          <ac:picMkLst>
-            <pc:docMk/>
-            <pc:sldMk cId="3984019750" sldId="1108"/>
-            <ac:picMk id="4" creationId="{7073CA70-7285-21C6-EE8B-A5315F7C2B95}"/>
-          </ac:picMkLst>
-        </pc:picChg>
         <pc:picChg chg="add mod">
           <ac:chgData name="Derek Ritz" userId="8fe56b9ef4ca82ce" providerId="LiveId" clId="{93D51821-5D50-43CA-9DF1-2C2B5339BB4D}" dt="2025-01-22T22:18:34.047" v="190" actId="1076"/>
           <ac:picMkLst>
@@ -2344,14 +2232,6 @@
             <pc:docMk/>
             <pc:sldMk cId="3583036682" sldId="1109"/>
             <ac:picMk id="2" creationId="{5AA6852D-5721-591F-98E0-9B94147C2EB7}"/>
-          </ac:picMkLst>
-        </pc:picChg>
-        <pc:picChg chg="del">
-          <ac:chgData name="Derek Ritz" userId="8fe56b9ef4ca82ce" providerId="LiveId" clId="{93D51821-5D50-43CA-9DF1-2C2B5339BB4D}" dt="2025-01-22T22:19:51.971" v="195" actId="478"/>
-          <ac:picMkLst>
-            <pc:docMk/>
-            <pc:sldMk cId="3583036682" sldId="1109"/>
-            <ac:picMk id="5" creationId="{252172E8-DB8A-E0E8-5C9A-7259CB43BF33}"/>
           </ac:picMkLst>
         </pc:picChg>
       </pc:sldChg>
@@ -2391,70 +2271,6 @@
             <pc:docMk/>
             <pc:sldMk cId="3379281834" sldId="1110"/>
             <ac:spMk id="5" creationId="{6533417C-C534-7C16-473A-BFFFC87AA3BF}"/>
-          </ac:spMkLst>
-        </pc:spChg>
-        <pc:spChg chg="add del mod">
-          <ac:chgData name="Derek Ritz" userId="8fe56b9ef4ca82ce" providerId="LiveId" clId="{93D51821-5D50-43CA-9DF1-2C2B5339BB4D}" dt="2025-01-22T22:27:31.285" v="228" actId="478"/>
-          <ac:spMkLst>
-            <pc:docMk/>
-            <pc:sldMk cId="3379281834" sldId="1110"/>
-            <ac:spMk id="6" creationId="{620A60B3-1549-4349-6034-B78B17B1142D}"/>
-          </ac:spMkLst>
-        </pc:spChg>
-        <pc:spChg chg="add del mod">
-          <ac:chgData name="Derek Ritz" userId="8fe56b9ef4ca82ce" providerId="LiveId" clId="{93D51821-5D50-43CA-9DF1-2C2B5339BB4D}" dt="2025-01-22T22:27:31.285" v="228" actId="478"/>
-          <ac:spMkLst>
-            <pc:docMk/>
-            <pc:sldMk cId="3379281834" sldId="1110"/>
-            <ac:spMk id="7" creationId="{71E2E763-59DC-0AFA-E002-32A31BFB7808}"/>
-          </ac:spMkLst>
-        </pc:spChg>
-        <pc:spChg chg="add del mod">
-          <ac:chgData name="Derek Ritz" userId="8fe56b9ef4ca82ce" providerId="LiveId" clId="{93D51821-5D50-43CA-9DF1-2C2B5339BB4D}" dt="2025-01-22T22:27:31.285" v="228" actId="478"/>
-          <ac:spMkLst>
-            <pc:docMk/>
-            <pc:sldMk cId="3379281834" sldId="1110"/>
-            <ac:spMk id="8" creationId="{0A00FE65-6A61-71DD-5765-5E12300C8480}"/>
-          </ac:spMkLst>
-        </pc:spChg>
-        <pc:spChg chg="add del mod">
-          <ac:chgData name="Derek Ritz" userId="8fe56b9ef4ca82ce" providerId="LiveId" clId="{93D51821-5D50-43CA-9DF1-2C2B5339BB4D}" dt="2025-01-22T22:27:31.285" v="228" actId="478"/>
-          <ac:spMkLst>
-            <pc:docMk/>
-            <pc:sldMk cId="3379281834" sldId="1110"/>
-            <ac:spMk id="9" creationId="{ABC0439E-7B88-5FF0-D759-DD5927F5FE28}"/>
-          </ac:spMkLst>
-        </pc:spChg>
-        <pc:spChg chg="add del mod">
-          <ac:chgData name="Derek Ritz" userId="8fe56b9ef4ca82ce" providerId="LiveId" clId="{93D51821-5D50-43CA-9DF1-2C2B5339BB4D}" dt="2025-01-22T22:31:16.090" v="283" actId="478"/>
-          <ac:spMkLst>
-            <pc:docMk/>
-            <pc:sldMk cId="3379281834" sldId="1110"/>
-            <ac:spMk id="10" creationId="{7317A5D2-AA6E-24C1-A3EA-4BE2192398AB}"/>
-          </ac:spMkLst>
-        </pc:spChg>
-        <pc:spChg chg="add del mod">
-          <ac:chgData name="Derek Ritz" userId="8fe56b9ef4ca82ce" providerId="LiveId" clId="{93D51821-5D50-43CA-9DF1-2C2B5339BB4D}" dt="2025-01-22T22:31:16.090" v="283" actId="478"/>
-          <ac:spMkLst>
-            <pc:docMk/>
-            <pc:sldMk cId="3379281834" sldId="1110"/>
-            <ac:spMk id="11" creationId="{80F7F809-AC06-A056-EDF2-BF9368DD1BB4}"/>
-          </ac:spMkLst>
-        </pc:spChg>
-        <pc:spChg chg="add del mod">
-          <ac:chgData name="Derek Ritz" userId="8fe56b9ef4ca82ce" providerId="LiveId" clId="{93D51821-5D50-43CA-9DF1-2C2B5339BB4D}" dt="2025-01-22T22:31:20.998" v="284" actId="478"/>
-          <ac:spMkLst>
-            <pc:docMk/>
-            <pc:sldMk cId="3379281834" sldId="1110"/>
-            <ac:spMk id="12" creationId="{D68122E3-295C-FE71-AA4A-433CAAA6D83D}"/>
-          </ac:spMkLst>
-        </pc:spChg>
-        <pc:spChg chg="add del mod">
-          <ac:chgData name="Derek Ritz" userId="8fe56b9ef4ca82ce" providerId="LiveId" clId="{93D51821-5D50-43CA-9DF1-2C2B5339BB4D}" dt="2025-01-22T22:31:20.998" v="284" actId="478"/>
-          <ac:spMkLst>
-            <pc:docMk/>
-            <pc:sldMk cId="3379281834" sldId="1110"/>
-            <ac:spMk id="13" creationId="{0970ADDF-4176-C3F7-99DF-4F58184D4DE5}"/>
           </ac:spMkLst>
         </pc:spChg>
         <pc:spChg chg="add mod">
@@ -2569,14 +2385,6 @@
             <ac:spMk id="36" creationId="{04FAC7CC-F176-3183-59AD-9684E7FE53DF}"/>
           </ac:spMkLst>
         </pc:spChg>
-        <pc:picChg chg="add del mod">
-          <ac:chgData name="Derek Ritz" userId="8fe56b9ef4ca82ce" providerId="LiveId" clId="{93D51821-5D50-43CA-9DF1-2C2B5339BB4D}" dt="2025-01-22T22:35:39.317" v="299" actId="478"/>
-          <ac:picMkLst>
-            <pc:docMk/>
-            <pc:sldMk cId="3379281834" sldId="1110"/>
-            <ac:picMk id="28" creationId="{FF2B1DC8-6797-AFF1-6042-B88B957086A3}"/>
-          </ac:picMkLst>
-        </pc:picChg>
         <pc:picChg chg="add mod">
           <ac:chgData name="Derek Ritz" userId="8fe56b9ef4ca82ce" providerId="LiveId" clId="{93D51821-5D50-43CA-9DF1-2C2B5339BB4D}" dt="2025-01-22T22:35:33.732" v="298" actId="207"/>
           <ac:picMkLst>
@@ -3279,6 +3087,101 @@
       </pc:sldMasterChg>
     </pc:docChg>
   </pc:docChgLst>
+  <pc:docChgLst>
+    <pc:chgData name="Derek Ritz" userId="8fe56b9ef4ca82ce" providerId="LiveId" clId="{78701E41-96E2-4D9C-9851-2F6EA43A2F40}"/>
+    <pc:docChg chg="addSld delSld modSld">
+      <pc:chgData name="Derek Ritz" userId="8fe56b9ef4ca82ce" providerId="LiveId" clId="{78701E41-96E2-4D9C-9851-2F6EA43A2F40}" dt="2025-01-24T16:57:57.278" v="50" actId="47"/>
+      <pc:docMkLst>
+        <pc:docMk/>
+      </pc:docMkLst>
+      <pc:sldChg chg="modSp mod">
+        <pc:chgData name="Derek Ritz" userId="8fe56b9ef4ca82ce" providerId="LiveId" clId="{78701E41-96E2-4D9C-9851-2F6EA43A2F40}" dt="2025-01-24T16:54:53.653" v="48" actId="208"/>
+        <pc:sldMkLst>
+          <pc:docMk/>
+          <pc:sldMk cId="3791092007" sldId="1099"/>
+        </pc:sldMkLst>
+        <pc:spChg chg="mod">
+          <ac:chgData name="Derek Ritz" userId="8fe56b9ef4ca82ce" providerId="LiveId" clId="{78701E41-96E2-4D9C-9851-2F6EA43A2F40}" dt="2025-01-24T16:53:46.892" v="44" actId="207"/>
+          <ac:spMkLst>
+            <pc:docMk/>
+            <pc:sldMk cId="3791092007" sldId="1099"/>
+            <ac:spMk id="7" creationId="{B80EEB9B-8225-7A6C-10D2-345C8F438A30}"/>
+          </ac:spMkLst>
+        </pc:spChg>
+        <pc:spChg chg="mod">
+          <ac:chgData name="Derek Ritz" userId="8fe56b9ef4ca82ce" providerId="LiveId" clId="{78701E41-96E2-4D9C-9851-2F6EA43A2F40}" dt="2025-01-24T16:52:40.229" v="38" actId="207"/>
+          <ac:spMkLst>
+            <pc:docMk/>
+            <pc:sldMk cId="3791092007" sldId="1099"/>
+            <ac:spMk id="9" creationId="{D222963B-8AC7-2519-1D01-04F297E55024}"/>
+          </ac:spMkLst>
+        </pc:spChg>
+        <pc:spChg chg="mod">
+          <ac:chgData name="Derek Ritz" userId="8fe56b9ef4ca82ce" providerId="LiveId" clId="{78701E41-96E2-4D9C-9851-2F6EA43A2F40}" dt="2025-01-24T16:54:38.603" v="47" actId="207"/>
+          <ac:spMkLst>
+            <pc:docMk/>
+            <pc:sldMk cId="3791092007" sldId="1099"/>
+            <ac:spMk id="14" creationId="{537861DB-7EF7-A8D7-682F-3C3D24279F2A}"/>
+          </ac:spMkLst>
+        </pc:spChg>
+        <pc:spChg chg="mod">
+          <ac:chgData name="Derek Ritz" userId="8fe56b9ef4ca82ce" providerId="LiveId" clId="{78701E41-96E2-4D9C-9851-2F6EA43A2F40}" dt="2025-01-24T16:54:53.653" v="48" actId="208"/>
+          <ac:spMkLst>
+            <pc:docMk/>
+            <pc:sldMk cId="3791092007" sldId="1099"/>
+            <ac:spMk id="15" creationId="{5BEF8543-33D6-9B5E-2B7B-48BC8645522D}"/>
+          </ac:spMkLst>
+        </pc:spChg>
+        <pc:spChg chg="mod">
+          <ac:chgData name="Derek Ritz" userId="8fe56b9ef4ca82ce" providerId="LiveId" clId="{78701E41-96E2-4D9C-9851-2F6EA43A2F40}" dt="2025-01-24T16:51:17.481" v="26" actId="6549"/>
+          <ac:spMkLst>
+            <pc:docMk/>
+            <pc:sldMk cId="3791092007" sldId="1099"/>
+            <ac:spMk id="17" creationId="{3CC0393E-90EE-C4A9-E9A9-105A785ADDAB}"/>
+          </ac:spMkLst>
+        </pc:spChg>
+        <pc:spChg chg="mod">
+          <ac:chgData name="Derek Ritz" userId="8fe56b9ef4ca82ce" providerId="LiveId" clId="{78701E41-96E2-4D9C-9851-2F6EA43A2F40}" dt="2025-01-24T16:51:42.236" v="28" actId="113"/>
+          <ac:spMkLst>
+            <pc:docMk/>
+            <pc:sldMk cId="3791092007" sldId="1099"/>
+            <ac:spMk id="18" creationId="{62754BD3-F5B8-2BB5-DD7A-BCB9F4BC930E}"/>
+          </ac:spMkLst>
+        </pc:spChg>
+        <pc:spChg chg="mod">
+          <ac:chgData name="Derek Ritz" userId="8fe56b9ef4ca82ce" providerId="LiveId" clId="{78701E41-96E2-4D9C-9851-2F6EA43A2F40}" dt="2025-01-24T16:51:53.883" v="37" actId="6549"/>
+          <ac:spMkLst>
+            <pc:docMk/>
+            <pc:sldMk cId="3791092007" sldId="1099"/>
+            <ac:spMk id="19" creationId="{F945C422-BFE9-C8D2-8840-6F498CCF3F3B}"/>
+          </ac:spMkLst>
+        </pc:spChg>
+        <pc:spChg chg="mod">
+          <ac:chgData name="Derek Ritz" userId="8fe56b9ef4ca82ce" providerId="LiveId" clId="{78701E41-96E2-4D9C-9851-2F6EA43A2F40}" dt="2025-01-24T16:53:25.444" v="43" actId="1076"/>
+          <ac:spMkLst>
+            <pc:docMk/>
+            <pc:sldMk cId="3791092007" sldId="1099"/>
+            <ac:spMk id="20" creationId="{EDBBE309-BC41-40B8-ADF3-BD213EF682BE}"/>
+          </ac:spMkLst>
+        </pc:spChg>
+        <pc:spChg chg="mod">
+          <ac:chgData name="Derek Ritz" userId="8fe56b9ef4ca82ce" providerId="LiveId" clId="{78701E41-96E2-4D9C-9851-2F6EA43A2F40}" dt="2025-01-24T16:52:58.219" v="39" actId="208"/>
+          <ac:spMkLst>
+            <pc:docMk/>
+            <pc:sldMk cId="3791092007" sldId="1099"/>
+            <ac:spMk id="38" creationId="{2278B976-054F-6721-73D6-1238F2FF8CC0}"/>
+          </ac:spMkLst>
+        </pc:spChg>
+      </pc:sldChg>
+      <pc:sldChg chg="new del">
+        <pc:chgData name="Derek Ritz" userId="8fe56b9ef4ca82ce" providerId="LiveId" clId="{78701E41-96E2-4D9C-9851-2F6EA43A2F40}" dt="2025-01-24T16:57:57.278" v="50" actId="47"/>
+        <pc:sldMkLst>
+          <pc:docMk/>
+          <pc:sldMk cId="1921443872" sldId="1114"/>
+        </pc:sldMkLst>
+      </pc:sldChg>
+    </pc:docChg>
+  </pc:docChgLst>
 </pc:chgInfo>
 </file>
 
@@ -3365,7 +3268,7 @@
             <a:fld id="{009DCC39-3072-45D9-85AE-68E90B861419}" type="datetimeFigureOut">
               <a:rPr lang="en-CA" smtClean="0"/>
               <a:pPr/>
-              <a:t>2025-01-22</a:t>
+              <a:t>2025-01-24</a:t>
             </a:fld>
             <a:endParaRPr lang="en-CA"/>
           </a:p>
@@ -4142,7 +4045,7 @@
           <a:p>
             <a:fld id="{2F51ED16-9B64-4F3D-8A3B-C6BF231E982B}" type="datetime1">
               <a:rPr lang="en-CA" smtClean="0"/>
-              <a:t>2025-01-22</a:t>
+              <a:t>2025-01-24</a:t>
             </a:fld>
             <a:endParaRPr lang="en-CA"/>
           </a:p>
@@ -4299,7 +4202,7 @@
           <a:p>
             <a:fld id="{DA64666D-DDF9-4C2E-8173-E7F55A3EDEB8}" type="datetime1">
               <a:rPr lang="en-CA" smtClean="0"/>
-              <a:t>2025-01-22</a:t>
+              <a:t>2025-01-24</a:t>
             </a:fld>
             <a:endParaRPr lang="en-CA"/>
           </a:p>
@@ -4477,7 +4380,7 @@
           <a:p>
             <a:fld id="{7BCB0910-DF15-4EEF-A560-2555422CA585}" type="datetime1">
               <a:rPr lang="en-CA" smtClean="0"/>
-              <a:t>2025-01-22</a:t>
+              <a:t>2025-01-24</a:t>
             </a:fld>
             <a:endParaRPr lang="en-CA"/>
           </a:p>
@@ -4773,7 +4676,7 @@
           <a:p>
             <a:fld id="{43C1CF2C-A23F-47E0-AADF-AE26A9C0C92C}" type="datetime1">
               <a:rPr lang="en-CA" smtClean="0"/>
-              <a:t>2025-01-22</a:t>
+              <a:t>2025-01-24</a:t>
             </a:fld>
             <a:endParaRPr lang="en-CA"/>
           </a:p>
@@ -5203,7 +5106,7 @@
           <a:p>
             <a:fld id="{0ED77F9A-DA9D-48AA-B957-52E2DD9FEB7D}" type="datetime1">
               <a:rPr lang="en-CA" smtClean="0"/>
-              <a:t>2025-01-22</a:t>
+              <a:t>2025-01-24</a:t>
             </a:fld>
             <a:endParaRPr lang="en-CA"/>
           </a:p>
@@ -5329,7 +5232,7 @@
           <a:p>
             <a:fld id="{53A1CC0E-4860-4FAF-B24C-909465CAB0C0}" type="datetime1">
               <a:rPr lang="en-CA" smtClean="0"/>
-              <a:t>2025-01-22</a:t>
+              <a:t>2025-01-24</a:t>
             </a:fld>
             <a:endParaRPr lang="en-CA"/>
           </a:p>
@@ -5432,7 +5335,7 @@
           <a:p>
             <a:fld id="{B8449B9C-0EF1-4F08-99A0-E81BE0E92314}" type="datetime1">
               <a:rPr lang="en-CA" smtClean="0"/>
-              <a:t>2025-01-22</a:t>
+              <a:t>2025-01-24</a:t>
             </a:fld>
             <a:endParaRPr lang="en-CA"/>
           </a:p>
@@ -5717,7 +5620,7 @@
           <a:p>
             <a:fld id="{BA50B19C-2161-4F40-86BF-AA9D2EDBA67A}" type="datetime1">
               <a:rPr lang="en-CA" smtClean="0"/>
-              <a:t>2025-01-22</a:t>
+              <a:t>2025-01-24</a:t>
             </a:fld>
             <a:endParaRPr lang="en-CA"/>
           </a:p>
@@ -5982,7 +5885,7 @@
           <a:p>
             <a:fld id="{AEB12FF0-E9C2-4D43-8012-472AE6A70029}" type="datetime1">
               <a:rPr lang="en-CA" smtClean="0"/>
-              <a:t>2025-01-22</a:t>
+              <a:t>2025-01-24</a:t>
             </a:fld>
             <a:endParaRPr lang="en-CA"/>
           </a:p>
@@ -6160,7 +6063,7 @@
           <a:p>
             <a:fld id="{721CEDCD-56BF-4777-8E89-D4726A1C4EB4}" type="datetime1">
               <a:rPr lang="en-CA" smtClean="0"/>
-              <a:t>2025-01-22</a:t>
+              <a:t>2025-01-24</a:t>
             </a:fld>
             <a:endParaRPr lang="en-CA"/>
           </a:p>
@@ -6407,7 +6310,7 @@
           <a:p>
             <a:fld id="{BA4321F9-EACE-47F5-BC48-0D359D1CEA76}" type="datetime1">
               <a:rPr lang="en-CA" smtClean="0"/>
-              <a:t>2025-01-22</a:t>
+              <a:t>2025-01-24</a:t>
             </a:fld>
             <a:endParaRPr lang="en-CA"/>
           </a:p>
@@ -13377,8 +13280,8 @@
           <a:ln>
             <a:solidFill>
               <a:schemeClr val="accent2">
-                <a:lumMod val="20000"/>
-                <a:lumOff val="80000"/>
+                <a:lumMod val="40000"/>
+                <a:lumOff val="60000"/>
               </a:schemeClr>
             </a:solidFill>
             <a:prstDash val="lgDash"/>
@@ -13780,7 +13683,7 @@
         <p:spPr>
           <a:xfrm>
             <a:off x="4276468" y="1739060"/>
-            <a:ext cx="2179507" cy="830997"/>
+            <a:ext cx="2754280" cy="830997"/>
           </a:xfrm>
           <a:prstGeom prst="rect">
             <a:avLst/>
@@ -13794,32 +13697,32 @@
           <a:lstStyle/>
           <a:p>
             <a:r>
-              <a:rPr lang="en-CA" sz="1600">
-                <a:solidFill>
-                  <a:schemeClr val="tx2"/>
-                </a:solidFill>
-              </a:rPr>
-              <a:t>X1. Search for Guideline</a:t>
-            </a:r>
-          </a:p>
-          <a:p>
-            <a:r>
-              <a:rPr lang="en-CA" sz="1600">
-                <a:solidFill>
-                  <a:schemeClr val="tx2"/>
-                </a:solidFill>
-              </a:rPr>
-              <a:t>X2. Retrieve Guideline</a:t>
-            </a:r>
-          </a:p>
-          <a:p>
-            <a:r>
-              <a:rPr lang="en-CA" sz="1600" b="1">
-                <a:solidFill>
-                  <a:schemeClr val="tx2"/>
-                </a:solidFill>
-              </a:rPr>
-              <a:t>X3. Publish Guideline*</a:t>
+              <a:rPr lang="en-CA" sz="1600" dirty="0">
+                <a:solidFill>
+                  <a:schemeClr val="tx2"/>
+                </a:solidFill>
+              </a:rPr>
+              <a:t>QRPH-61: Search for Guideline</a:t>
+            </a:r>
+          </a:p>
+          <a:p>
+            <a:r>
+              <a:rPr lang="en-CA" sz="1600" dirty="0">
+                <a:solidFill>
+                  <a:schemeClr val="tx2"/>
+                </a:solidFill>
+              </a:rPr>
+              <a:t>QRPH-62: Retrieve Guideline</a:t>
+            </a:r>
+          </a:p>
+          <a:p>
+            <a:r>
+              <a:rPr lang="en-CA" sz="1600" b="1" dirty="0">
+                <a:solidFill>
+                  <a:schemeClr val="tx2"/>
+                </a:solidFill>
+              </a:rPr>
+              <a:t>QRPH-63: Publish Guideline*</a:t>
             </a:r>
           </a:p>
         </p:txBody>
@@ -13839,7 +13742,7 @@
         <p:spPr>
           <a:xfrm>
             <a:off x="4281212" y="6000243"/>
-            <a:ext cx="1827744" cy="338554"/>
+            <a:ext cx="2432076" cy="338554"/>
           </a:xfrm>
           <a:prstGeom prst="rect">
             <a:avLst/>
@@ -13858,7 +13761,7 @@
                   <a:schemeClr val="tx2"/>
                 </a:solidFill>
               </a:rPr>
-              <a:t>X4. Apply guideline</a:t>
+              <a:t>QRPH-64: Apply guideline</a:t>
             </a:r>
           </a:p>
         </p:txBody>
@@ -14312,7 +14215,7 @@
           </a:solidFill>
           <a:ln>
             <a:solidFill>
-              <a:srgbClr val="FFC000"/>
+              <a:srgbClr val="FF9900"/>
             </a:solidFill>
           </a:ln>
         </p:spPr>
@@ -14340,7 +14243,7 @@
             <a:r>
               <a:rPr lang="en-CA" sz="2000">
                 <a:solidFill>
-                  <a:srgbClr val="FFC000"/>
+                  <a:srgbClr val="FF9900"/>
                 </a:solidFill>
               </a:rPr>
               <a:t>2</a:t>
@@ -14690,7 +14593,7 @@
             <a:r>
               <a:rPr lang="en-CA" sz="1500" b="1" dirty="0">
                 <a:solidFill>
-                  <a:srgbClr val="92D050"/>
+                  <a:srgbClr val="00B050"/>
                 </a:solidFill>
               </a:rPr>
               <a:t>CCGs are </a:t>
@@ -14701,7 +14604,7 @@
             <a:r>
               <a:rPr lang="en-CA" sz="1500" b="1" dirty="0">
                 <a:solidFill>
-                  <a:srgbClr val="92D050"/>
+                  <a:srgbClr val="00B050"/>
                 </a:solidFill>
               </a:rPr>
               <a:t>published</a:t>
@@ -14741,7 +14644,7 @@
             <a:r>
               <a:rPr lang="en-CA" sz="1500" b="1" dirty="0">
                 <a:solidFill>
-                  <a:srgbClr val="FFC000"/>
+                  <a:srgbClr val="FF9900"/>
                 </a:solidFill>
               </a:rPr>
               <a:t>$apply Engines regularly refresh their local cache of published CCGs.</a:t>
@@ -14844,7 +14747,7 @@
         <p:spPr>
           <a:xfrm>
             <a:off x="9594482" y="2087491"/>
-            <a:ext cx="3528950" cy="784830"/>
+            <a:ext cx="3061521" cy="830997"/>
           </a:xfrm>
           <a:prstGeom prst="rect">
             <a:avLst/>
@@ -14858,66 +14761,60 @@
           <a:lstStyle/>
           <a:p>
             <a:r>
-              <a:rPr lang="en-CA" sz="1500" dirty="0">
+              <a:rPr lang="en-CA" sz="1600" dirty="0">
                 <a:solidFill>
                   <a:schemeClr val="accent2">
-                    <a:lumMod val="60000"/>
-                    <a:lumOff val="40000"/>
+                    <a:lumMod val="75000"/>
                   </a:schemeClr>
                 </a:solidFill>
               </a:rPr>
               <a:t>In an </a:t>
             </a:r>
             <a:r>
-              <a:rPr lang="en-CA" sz="1500" u="sng" dirty="0">
+              <a:rPr lang="en-CA" sz="1600" u="sng" dirty="0">
                 <a:solidFill>
                   <a:schemeClr val="accent2">
-                    <a:lumMod val="60000"/>
-                    <a:lumOff val="40000"/>
+                    <a:lumMod val="75000"/>
                   </a:schemeClr>
                 </a:solidFill>
               </a:rPr>
               <a:t>out-of-band</a:t>
             </a:r>
             <a:r>
-              <a:rPr lang="en-CA" sz="1500" dirty="0">
+              <a:rPr lang="en-CA" sz="1600" dirty="0">
                 <a:solidFill>
                   <a:schemeClr val="accent2">
-                    <a:lumMod val="60000"/>
-                    <a:lumOff val="40000"/>
+                    <a:lumMod val="75000"/>
                   </a:schemeClr>
                 </a:solidFill>
               </a:rPr>
               <a:t> process, a list of </a:t>
             </a:r>
             <a:r>
-              <a:rPr lang="en-CA" sz="1500" b="1" i="1" dirty="0">
+              <a:rPr lang="en-CA" sz="1600" b="1" i="1" dirty="0">
                 <a:solidFill>
                   <a:schemeClr val="accent2">
-                    <a:lumMod val="60000"/>
-                    <a:lumOff val="40000"/>
+                    <a:lumMod val="75000"/>
                   </a:schemeClr>
                 </a:solidFill>
               </a:rPr>
               <a:t>available</a:t>
             </a:r>
             <a:r>
-              <a:rPr lang="en-CA" sz="1500" i="1" dirty="0">
+              <a:rPr lang="en-CA" sz="1600" i="1" dirty="0">
                 <a:solidFill>
                   <a:schemeClr val="accent2">
-                    <a:lumMod val="60000"/>
-                    <a:lumOff val="40000"/>
+                    <a:lumMod val="75000"/>
                   </a:schemeClr>
                 </a:solidFill>
               </a:rPr>
               <a:t> </a:t>
             </a:r>
             <a:r>
-              <a:rPr lang="en-CA" sz="1500" dirty="0">
+              <a:rPr lang="en-CA" sz="1600" dirty="0">
                 <a:solidFill>
                   <a:schemeClr val="accent2">
-                    <a:lumMod val="60000"/>
-                    <a:lumOff val="40000"/>
+                    <a:lumMod val="75000"/>
                   </a:schemeClr>
                 </a:solidFill>
               </a:rPr>
@@ -14940,8 +14837,8 @@
         </p:nvSpPr>
         <p:spPr>
           <a:xfrm>
-            <a:off x="9594480" y="5687267"/>
-            <a:ext cx="4842191" cy="784830"/>
+            <a:off x="9580006" y="5547410"/>
+            <a:ext cx="4036176" cy="1077218"/>
           </a:xfrm>
           <a:prstGeom prst="rect">
             <a:avLst/>
@@ -14955,25 +14852,25 @@
           <a:lstStyle/>
           <a:p>
             <a:r>
-              <a:rPr lang="en-CA" sz="1500" b="1" dirty="0">
-                <a:solidFill>
-                  <a:srgbClr val="FFC000"/>
+              <a:rPr lang="en-CA" sz="1600" dirty="0">
+                <a:solidFill>
+                  <a:srgbClr val="FF9900"/>
                 </a:solidFill>
               </a:rPr>
               <a:t>By assuming the Engine </a:t>
             </a:r>
             <a:r>
-              <a:rPr lang="en-CA" sz="1500" b="1" i="1" u="sng" dirty="0">
-                <a:solidFill>
-                  <a:srgbClr val="FFC000"/>
+              <a:rPr lang="en-CA" sz="1600" i="1" u="sng" dirty="0">
+                <a:solidFill>
+                  <a:srgbClr val="FF9900"/>
                 </a:solidFill>
               </a:rPr>
               <a:t>has</a:t>
             </a:r>
             <a:r>
-              <a:rPr lang="en-CA" sz="1500" b="1" dirty="0">
-                <a:solidFill>
-                  <a:srgbClr val="FFC000"/>
+              <a:rPr lang="en-CA" sz="1600" dirty="0">
+                <a:solidFill>
+                  <a:srgbClr val="FF9900"/>
                 </a:solidFill>
               </a:rPr>
               <a:t> the relevant CCGs, we can forego having to have the Performer hold a CCG copy and pass it to the Engine as part of the transaction bundle.</a:t>
@@ -14996,7 +14893,7 @@
         <p:spPr>
           <a:xfrm>
             <a:off x="8283673" y="3281114"/>
-            <a:ext cx="2230547" cy="584775"/>
+            <a:ext cx="2780377" cy="584775"/>
           </a:xfrm>
           <a:prstGeom prst="rect">
             <a:avLst/>
@@ -15015,7 +14912,7 @@
                   <a:schemeClr val="tx2"/>
                 </a:solidFill>
               </a:rPr>
-              <a:t>X1. Search for Guideline</a:t>
+              <a:t>QRPH-61: Search for Guideline</a:t>
             </a:r>
           </a:p>
           <a:p>
@@ -15025,7 +14922,7 @@
                   <a:schemeClr val="tx2"/>
                 </a:solidFill>
               </a:rPr>
-              <a:t>X2. Retrieve Guideline</a:t>
+              <a:t>QRPH-62: Retrieve Guideline</a:t>
             </a:r>
           </a:p>
         </p:txBody>

</xml_diff>